<commit_message>
final version + ppt
</commit_message>
<xml_diff>
--- a/Diplomski rad_Novosel - prezentacija.pptx
+++ b/Diplomski rad_Novosel - prezentacija.pptx
@@ -5,7 +5,7 @@
     <p:sldMasterId id="2147483659" r:id="rId1"/>
   </p:sldMasterIdLst>
   <p:notesMasterIdLst>
-    <p:notesMasterId r:id="rId16"/>
+    <p:notesMasterId r:id="rId17"/>
   </p:notesMasterIdLst>
   <p:sldIdLst>
     <p:sldId id="256" r:id="rId2"/>
@@ -21,24 +21,25 @@
     <p:sldId id="266" r:id="rId12"/>
     <p:sldId id="267" r:id="rId13"/>
     <p:sldId id="268" r:id="rId14"/>
-    <p:sldId id="269" r:id="rId15"/>
+    <p:sldId id="271" r:id="rId15"/>
+    <p:sldId id="269" r:id="rId16"/>
   </p:sldIdLst>
   <p:sldSz cx="9144000" cy="5143500" type="screen16x9"/>
   <p:notesSz cx="6858000" cy="9144000"/>
   <p:embeddedFontLst>
     <p:embeddedFont>
       <p:font typeface="Lato" panose="020F0502020204030203" pitchFamily="34" charset="0"/>
-      <p:regular r:id="rId17"/>
-      <p:bold r:id="rId18"/>
-      <p:italic r:id="rId19"/>
-      <p:boldItalic r:id="rId20"/>
+      <p:regular r:id="rId18"/>
+      <p:bold r:id="rId19"/>
+      <p:italic r:id="rId20"/>
+      <p:boldItalic r:id="rId21"/>
     </p:embeddedFont>
     <p:embeddedFont>
       <p:font typeface="Raleway" pitchFamily="2" charset="0"/>
-      <p:regular r:id="rId21"/>
-      <p:bold r:id="rId22"/>
-      <p:italic r:id="rId23"/>
-      <p:boldItalic r:id="rId24"/>
+      <p:regular r:id="rId22"/>
+      <p:bold r:id="rId23"/>
+      <p:italic r:id="rId24"/>
+      <p:boldItalic r:id="rId25"/>
     </p:embeddedFont>
   </p:embeddedFontLst>
   <p:defaultTextStyle>
@@ -7710,7 +7711,7 @@
           <a:p>
             <a:r>
               <a:rPr lang="hr-HR" dirty="0"/>
-              <a:t>Rezultati</a:t>
+              <a:t>Rezultati - vizualizacije</a:t>
             </a:r>
             <a:endParaRPr lang="en-US" dirty="0"/>
           </a:p>
@@ -7768,10 +7769,10 @@
       </p:sp>
       <p:pic>
         <p:nvPicPr>
-          <p:cNvPr id="5" name="Picture 4" descr="A colorful dots on a white background&#10;&#10;Description automatically generated">
+          <p:cNvPr id="7" name="Picture 6" descr="A diagram of a number of dots&#10;&#10;Description automatically generated with medium confidence">
             <a:extLst>
               <a:ext uri="{FF2B5EF4-FFF2-40B4-BE49-F238E27FC236}">
-                <a16:creationId xmlns:a16="http://schemas.microsoft.com/office/drawing/2014/main" id="{27E46E73-7FF3-4E4C-C488-E1D6B56A63A8}"/>
+                <a16:creationId xmlns:a16="http://schemas.microsoft.com/office/drawing/2014/main" id="{16B201C3-F6F1-893F-368F-A769259F841C}"/>
               </a:ext>
             </a:extLst>
           </p:cNvPr>
@@ -7795,8 +7796,8 @@
         </p:blipFill>
         <p:spPr bwMode="auto">
           <a:xfrm>
-            <a:off x="231897" y="1491425"/>
-            <a:ext cx="4411707" cy="2848550"/>
+            <a:off x="179955" y="1491425"/>
+            <a:ext cx="4323669" cy="2791636"/>
           </a:xfrm>
           <a:prstGeom prst="rect">
             <a:avLst/>
@@ -7809,10 +7810,10 @@
       </p:pic>
       <p:pic>
         <p:nvPicPr>
-          <p:cNvPr id="6" name="Picture 5" descr="A group of colorful dots&#10;&#10;Description automatically generated">
+          <p:cNvPr id="8" name="Picture 7" descr="A colorful dots on a white background&#10;&#10;Description automatically generated">
             <a:extLst>
               <a:ext uri="{FF2B5EF4-FFF2-40B4-BE49-F238E27FC236}">
-                <a16:creationId xmlns:a16="http://schemas.microsoft.com/office/drawing/2014/main" id="{435ED4DF-F4AD-ACE5-9CA7-AD3FD8CAC381}"/>
+                <a16:creationId xmlns:a16="http://schemas.microsoft.com/office/drawing/2014/main" id="{0D357D53-BB79-3A83-4B9C-DD97FC4C6FC6}"/>
               </a:ext>
             </a:extLst>
           </p:cNvPr>
@@ -7836,8 +7837,8 @@
         </p:blipFill>
         <p:spPr bwMode="auto">
           <a:xfrm>
-            <a:off x="4640377" y="1491425"/>
-            <a:ext cx="4516894" cy="2916110"/>
+            <a:off x="4640376" y="1491425"/>
+            <a:ext cx="4323669" cy="2791636"/>
           </a:xfrm>
           <a:prstGeom prst="rect">
             <a:avLst/>
@@ -7908,7 +7909,7 @@
           <a:p>
             <a:r>
               <a:rPr lang="hr-HR" dirty="0"/>
-              <a:t>Rezultati</a:t>
+              <a:t>Rezultati - vizualizacije</a:t>
             </a:r>
             <a:endParaRPr lang="en-US" dirty="0"/>
           </a:p>
@@ -7966,10 +7967,10 @@
       </p:sp>
       <p:pic>
         <p:nvPicPr>
-          <p:cNvPr id="7" name="Picture 6" descr="A black and orange dot&#10;&#10;Description automatically generated with medium confidence">
+          <p:cNvPr id="5" name="Picture 4" descr="A black circle with many colored dots&#10;&#10;Description automatically generated with medium confidence">
             <a:extLst>
               <a:ext uri="{FF2B5EF4-FFF2-40B4-BE49-F238E27FC236}">
-                <a16:creationId xmlns:a16="http://schemas.microsoft.com/office/drawing/2014/main" id="{34E3BBDD-5560-08C9-6449-BABB76A2CB57}"/>
+                <a16:creationId xmlns:a16="http://schemas.microsoft.com/office/drawing/2014/main" id="{95A55F8B-906B-6834-728E-6B37C6EE8F55}"/>
               </a:ext>
             </a:extLst>
           </p:cNvPr>
@@ -7993,8 +7994,8 @@
         </p:blipFill>
         <p:spPr bwMode="auto">
           <a:xfrm>
-            <a:off x="1916060" y="1540921"/>
-            <a:ext cx="5168673" cy="3337008"/>
+            <a:off x="2239003" y="1687565"/>
+            <a:ext cx="4522787" cy="2920010"/>
           </a:xfrm>
           <a:prstGeom prst="rect">
             <a:avLst/>
@@ -8065,7 +8066,7 @@
           <a:p>
             <a:r>
               <a:rPr lang="hr-HR" dirty="0"/>
-              <a:t>Rezultati</a:t>
+              <a:t>Rezultati - vizualizacije</a:t>
             </a:r>
             <a:endParaRPr lang="en-US" dirty="0"/>
           </a:p>
@@ -8123,10 +8124,10 @@
       </p:sp>
       <p:pic>
         <p:nvPicPr>
-          <p:cNvPr id="7" name="Picture 6" descr="A graph with many colored dots&#10;&#10;Description automatically generated">
+          <p:cNvPr id="5" name="Picture 4" descr="A screen shot of a graph&#10;&#10;Description automatically generated">
             <a:extLst>
               <a:ext uri="{FF2B5EF4-FFF2-40B4-BE49-F238E27FC236}">
-                <a16:creationId xmlns:a16="http://schemas.microsoft.com/office/drawing/2014/main" id="{E1D1AAB2-0B2C-0D7A-552F-D8B583EEBDDF}"/>
+                <a16:creationId xmlns:a16="http://schemas.microsoft.com/office/drawing/2014/main" id="{EB5C7AD0-A91A-50B1-F6D7-78F7B451C5E2}"/>
               </a:ext>
             </a:extLst>
           </p:cNvPr>
@@ -8150,8 +8151,8 @@
         </p:blipFill>
         <p:spPr bwMode="auto">
           <a:xfrm>
-            <a:off x="35323" y="1441101"/>
-            <a:ext cx="4536677" cy="2916110"/>
+            <a:off x="2309657" y="2004121"/>
+            <a:ext cx="4879121" cy="3135726"/>
           </a:xfrm>
           <a:prstGeom prst="rect">
             <a:avLst/>
@@ -8164,10 +8165,10 @@
       </p:pic>
       <p:pic>
         <p:nvPicPr>
-          <p:cNvPr id="8" name="Picture 7" descr="A graph with many colored dots&#10;&#10;Description automatically generated">
+          <p:cNvPr id="9" name="Picture 8">
             <a:extLst>
               <a:ext uri="{FF2B5EF4-FFF2-40B4-BE49-F238E27FC236}">
-                <a16:creationId xmlns:a16="http://schemas.microsoft.com/office/drawing/2014/main" id="{CFA84CAC-514C-E8E5-8094-85746BE8A8A2}"/>
+                <a16:creationId xmlns:a16="http://schemas.microsoft.com/office/drawing/2014/main" id="{5E897CF0-23DD-E000-69BC-D12CA38079EE}"/>
               </a:ext>
             </a:extLst>
           </p:cNvPr>
@@ -8177,30 +8178,19 @@
           <p:nvPr/>
         </p:nvPicPr>
         <p:blipFill>
-          <a:blip r:embed="rId3">
-            <a:extLst>
-              <a:ext uri="{28A0092B-C50C-407E-A947-70E740481C1C}">
-                <a14:useLocalDpi xmlns:a14="http://schemas.microsoft.com/office/drawing/2010/main" val="0"/>
-              </a:ext>
-            </a:extLst>
-          </a:blip>
-          <a:srcRect/>
+          <a:blip r:embed="rId3"/>
           <a:stretch>
             <a:fillRect/>
           </a:stretch>
         </p:blipFill>
-        <p:spPr bwMode="auto">
+        <p:spPr>
           <a:xfrm>
-            <a:off x="4572000" y="1423865"/>
-            <a:ext cx="4536677" cy="2916110"/>
+            <a:off x="1966656" y="1071125"/>
+            <a:ext cx="5565124" cy="932996"/>
           </a:xfrm>
           <a:prstGeom prst="rect">
             <a:avLst/>
           </a:prstGeom>
-          <a:noFill/>
-          <a:ln>
-            <a:noFill/>
-          </a:ln>
         </p:spPr>
       </p:pic>
     </p:spTree>
@@ -8263,7 +8253,7 @@
           <a:p>
             <a:r>
               <a:rPr lang="hr-HR" dirty="0"/>
-              <a:t>Rezultati</a:t>
+              <a:t>Rezultati – korelacijska analiza</a:t>
             </a:r>
             <a:endParaRPr lang="en-US" dirty="0"/>
           </a:p>
@@ -8285,12 +8275,71 @@
             <p:ph type="body" idx="1"/>
           </p:nvPr>
         </p:nvSpPr>
-        <p:spPr/>
+        <p:spPr>
+          <a:xfrm>
+            <a:off x="659425" y="1294472"/>
+            <a:ext cx="3774300" cy="2261100"/>
+          </a:xfrm>
+        </p:spPr>
         <p:txBody>
-          <a:bodyPr/>
+          <a:bodyPr>
+            <a:normAutofit/>
+          </a:bodyPr>
           <a:lstStyle/>
           <a:p>
-            <a:endParaRPr lang="en-US"/>
+            <a:r>
+              <a:rPr lang="hr-HR" sz="1400" dirty="0">
+                <a:solidFill>
+                  <a:schemeClr val="bg2"/>
+                </a:solidFill>
+                <a:latin typeface="Times New Roman" panose="02020603050405020304" pitchFamily="18" charset="0"/>
+                <a:cs typeface="Times New Roman" panose="02020603050405020304" pitchFamily="18" charset="0"/>
+              </a:rPr>
+              <a:t>Kontinuiranost</a:t>
+            </a:r>
+          </a:p>
+          <a:p>
+            <a:r>
+              <a:rPr lang="hr-HR" sz="1400" dirty="0">
+                <a:solidFill>
+                  <a:schemeClr val="bg2"/>
+                </a:solidFill>
+                <a:latin typeface="Times New Roman" panose="02020603050405020304" pitchFamily="18" charset="0"/>
+                <a:cs typeface="Times New Roman" panose="02020603050405020304" pitchFamily="18" charset="0"/>
+              </a:rPr>
+              <a:t>Linearna veza</a:t>
+            </a:r>
+          </a:p>
+          <a:p>
+            <a:r>
+              <a:rPr lang="hr-HR" sz="1400" dirty="0">
+                <a:solidFill>
+                  <a:schemeClr val="bg2"/>
+                </a:solidFill>
+                <a:latin typeface="Times New Roman" panose="02020603050405020304" pitchFamily="18" charset="0"/>
+                <a:cs typeface="Times New Roman" panose="02020603050405020304" pitchFamily="18" charset="0"/>
+              </a:rPr>
+              <a:t>Normalna distribucija</a:t>
+            </a:r>
+          </a:p>
+          <a:p>
+            <a:r>
+              <a:rPr lang="hr-HR" sz="1400" dirty="0">
+                <a:solidFill>
+                  <a:schemeClr val="bg2"/>
+                </a:solidFill>
+                <a:latin typeface="Times New Roman" panose="02020603050405020304" pitchFamily="18" charset="0"/>
+                <a:cs typeface="Times New Roman" panose="02020603050405020304" pitchFamily="18" charset="0"/>
+              </a:rPr>
+              <a:t>Nedostatak outliera</a:t>
+            </a:r>
+            <a:endParaRPr lang="en-US" sz="1400" dirty="0">
+              <a:solidFill>
+                <a:schemeClr val="bg2"/>
+              </a:solidFill>
+              <a:latin typeface="Times New Roman" panose="02020603050405020304" pitchFamily="18" charset="0"/>
+              <a:cs typeface="Times New Roman" panose="02020603050405020304" pitchFamily="18" charset="0"/>
+            </a:endParaRPr>
           </a:p>
         </p:txBody>
       </p:sp>
@@ -8310,7 +8359,12 @@
             <p:ph type="body" idx="2"/>
           </p:nvPr>
         </p:nvSpPr>
-        <p:spPr/>
+        <p:spPr>
+          <a:xfrm>
+            <a:off x="4643605" y="1441200"/>
+            <a:ext cx="3774300" cy="2261100"/>
+          </a:xfrm>
+        </p:spPr>
         <p:txBody>
           <a:bodyPr/>
           <a:lstStyle/>
@@ -8321,10 +8375,493 @@
       </p:sp>
       <p:pic>
         <p:nvPicPr>
-          <p:cNvPr id="6" name="Picture 5">
+          <p:cNvPr id="8" name="Picture 7" descr="A graph with blue dots&#10;&#10;Description automatically generated">
             <a:extLst>
               <a:ext uri="{FF2B5EF4-FFF2-40B4-BE49-F238E27FC236}">
-                <a16:creationId xmlns:a16="http://schemas.microsoft.com/office/drawing/2014/main" id="{092717FD-BA04-0677-6EA3-F90C26CB7534}"/>
+                <a16:creationId xmlns:a16="http://schemas.microsoft.com/office/drawing/2014/main" id="{E190C6E0-A152-879F-2F09-30993644A102}"/>
+              </a:ext>
+            </a:extLst>
+          </p:cNvPr>
+          <p:cNvPicPr>
+            <a:picLocks noChangeAspect="1"/>
+          </p:cNvPicPr>
+          <p:nvPr/>
+        </p:nvPicPr>
+        <p:blipFill>
+          <a:blip r:embed="rId2">
+            <a:extLst>
+              <a:ext uri="{28A0092B-C50C-407E-A947-70E740481C1C}">
+                <a14:useLocalDpi xmlns:a14="http://schemas.microsoft.com/office/drawing/2010/main" val="0"/>
+              </a:ext>
+            </a:extLst>
+          </a:blip>
+          <a:srcRect/>
+          <a:stretch>
+            <a:fillRect/>
+          </a:stretch>
+        </p:blipFill>
+        <p:spPr bwMode="auto">
+          <a:xfrm>
+            <a:off x="107811" y="2429668"/>
+            <a:ext cx="3221597" cy="2545264"/>
+          </a:xfrm>
+          <a:prstGeom prst="rect">
+            <a:avLst/>
+          </a:prstGeom>
+          <a:noFill/>
+          <a:ln>
+            <a:noFill/>
+          </a:ln>
+        </p:spPr>
+      </p:pic>
+      <p:pic>
+        <p:nvPicPr>
+          <p:cNvPr id="9" name="Picture 8" descr="A red and blue graph&#10;&#10;Description automatically generated">
+            <a:extLst>
+              <a:ext uri="{FF2B5EF4-FFF2-40B4-BE49-F238E27FC236}">
+                <a16:creationId xmlns:a16="http://schemas.microsoft.com/office/drawing/2014/main" id="{65C425FA-CE75-C746-57AA-6E21054AD06B}"/>
+              </a:ext>
+            </a:extLst>
+          </p:cNvPr>
+          <p:cNvPicPr>
+            <a:picLocks noChangeAspect="1"/>
+          </p:cNvPicPr>
+          <p:nvPr/>
+        </p:nvPicPr>
+        <p:blipFill>
+          <a:blip r:embed="rId3">
+            <a:extLst>
+              <a:ext uri="{28A0092B-C50C-407E-A947-70E740481C1C}">
+                <a14:useLocalDpi xmlns:a14="http://schemas.microsoft.com/office/drawing/2010/main" val="0"/>
+              </a:ext>
+            </a:extLst>
+          </a:blip>
+          <a:srcRect/>
+          <a:stretch>
+            <a:fillRect/>
+          </a:stretch>
+        </p:blipFill>
+        <p:spPr bwMode="auto">
+          <a:xfrm>
+            <a:off x="4025320" y="2425022"/>
+            <a:ext cx="5010869" cy="2486297"/>
+          </a:xfrm>
+          <a:prstGeom prst="rect">
+            <a:avLst/>
+          </a:prstGeom>
+          <a:noFill/>
+          <a:ln>
+            <a:noFill/>
+          </a:ln>
+        </p:spPr>
+      </p:pic>
+    </p:spTree>
+    <p:extLst>
+      <p:ext uri="{BB962C8B-B14F-4D97-AF65-F5344CB8AC3E}">
+        <p14:creationId xmlns:p14="http://schemas.microsoft.com/office/powerpoint/2010/main" val="3517878493"/>
+      </p:ext>
+    </p:extLst>
+  </p:cSld>
+  <p:clrMapOvr>
+    <a:masterClrMapping/>
+  </p:clrMapOvr>
+</p:sld>
+</file>
+
+<file path=ppt/slides/slide14.xml><?xml version="1.0" encoding="utf-8"?>
+<p:sld xmlns:a="http://schemas.openxmlformats.org/drawingml/2006/main" xmlns:r="http://schemas.openxmlformats.org/officeDocument/2006/relationships" xmlns:p="http://schemas.openxmlformats.org/presentationml/2006/main">
+  <p:cSld>
+    <p:spTree>
+      <p:nvGrpSpPr>
+        <p:cNvPr id="1" name=""/>
+        <p:cNvGrpSpPr/>
+        <p:nvPr/>
+      </p:nvGrpSpPr>
+      <p:grpSpPr>
+        <a:xfrm>
+          <a:off x="0" y="0"/>
+          <a:ext cx="0" cy="0"/>
+          <a:chOff x="0" y="0"/>
+          <a:chExt cx="0" cy="0"/>
+        </a:xfrm>
+      </p:grpSpPr>
+      <p:sp>
+        <p:nvSpPr>
+          <p:cNvPr id="3" name="Text Placeholder 2">
+            <a:extLst>
+              <a:ext uri="{FF2B5EF4-FFF2-40B4-BE49-F238E27FC236}">
+                <a16:creationId xmlns:a16="http://schemas.microsoft.com/office/drawing/2014/main" id="{AFF46398-393F-CFC7-1974-6D2C7E54FE0D}"/>
+              </a:ext>
+            </a:extLst>
+          </p:cNvPr>
+          <p:cNvSpPr>
+            <a:spLocks noGrp="1"/>
+          </p:cNvSpPr>
+          <p:nvPr>
+            <p:ph type="body" idx="1"/>
+          </p:nvPr>
+        </p:nvSpPr>
+        <p:spPr>
+          <a:xfrm>
+            <a:off x="727650" y="1441200"/>
+            <a:ext cx="7688700" cy="2261100"/>
+          </a:xfrm>
+        </p:spPr>
+        <p:txBody>
+          <a:bodyPr/>
+          <a:lstStyle/>
+          <a:p>
+            <a:r>
+              <a:rPr lang="hr-HR" sz="1400" dirty="0">
+                <a:solidFill>
+                  <a:schemeClr val="bg2"/>
+                </a:solidFill>
+                <a:latin typeface="Times New Roman" panose="02020603050405020304" pitchFamily="18" charset="0"/>
+                <a:cs typeface="Times New Roman" panose="02020603050405020304" pitchFamily="18" charset="0"/>
+              </a:rPr>
+              <a:t>Nedostatak korelacije između varijabli</a:t>
+            </a:r>
+          </a:p>
+          <a:p>
+            <a:endParaRPr lang="hr-HR" sz="1400" dirty="0">
+              <a:solidFill>
+                <a:schemeClr val="bg2"/>
+              </a:solidFill>
+              <a:latin typeface="Times New Roman" panose="02020603050405020304" pitchFamily="18" charset="0"/>
+              <a:cs typeface="Times New Roman" panose="02020603050405020304" pitchFamily="18" charset="0"/>
+            </a:endParaRPr>
+          </a:p>
+          <a:p>
+            <a:r>
+              <a:rPr lang="hr-HR" sz="1400" dirty="0">
+                <a:solidFill>
+                  <a:schemeClr val="bg2"/>
+                </a:solidFill>
+                <a:latin typeface="Times New Roman" panose="02020603050405020304" pitchFamily="18" charset="0"/>
+                <a:cs typeface="Times New Roman" panose="02020603050405020304" pitchFamily="18" charset="0"/>
+              </a:rPr>
+              <a:t>Prikazi peptida pomoću sekvenci i pomoću fizikalno-kemijskih značajki nose različite informacije</a:t>
+            </a:r>
+          </a:p>
+          <a:p>
+            <a:endParaRPr lang="hr-HR" sz="1400" dirty="0">
+              <a:solidFill>
+                <a:schemeClr val="bg2"/>
+              </a:solidFill>
+              <a:latin typeface="Times New Roman" panose="02020603050405020304" pitchFamily="18" charset="0"/>
+              <a:cs typeface="Times New Roman" panose="02020603050405020304" pitchFamily="18" charset="0"/>
+            </a:endParaRPr>
+          </a:p>
+          <a:p>
+            <a:r>
+              <a:rPr lang="hr-HR" sz="1400" dirty="0">
+                <a:solidFill>
+                  <a:schemeClr val="bg2"/>
+                </a:solidFill>
+                <a:latin typeface="Times New Roman" panose="02020603050405020304" pitchFamily="18" charset="0"/>
+                <a:cs typeface="Times New Roman" panose="02020603050405020304" pitchFamily="18" charset="0"/>
+              </a:rPr>
+              <a:t>Mogućnost drugačijih rezultata s latentnim prostorom većih dimenzija</a:t>
+            </a:r>
+          </a:p>
+          <a:p>
+            <a:endParaRPr lang="en-US" dirty="0"/>
+          </a:p>
+        </p:txBody>
+      </p:sp>
+      <p:sp>
+        <p:nvSpPr>
+          <p:cNvPr id="4" name="Title 1">
+            <a:extLst>
+              <a:ext uri="{FF2B5EF4-FFF2-40B4-BE49-F238E27FC236}">
+                <a16:creationId xmlns:a16="http://schemas.microsoft.com/office/drawing/2014/main" id="{AA0AC001-4848-00E4-441A-6AEF3C2939C4}"/>
+              </a:ext>
+            </a:extLst>
+          </p:cNvPr>
+          <p:cNvSpPr txBox="1">
+            <a:spLocks/>
+          </p:cNvSpPr>
+          <p:nvPr/>
+        </p:nvSpPr>
+        <p:spPr>
+          <a:xfrm>
+            <a:off x="659425" y="535925"/>
+            <a:ext cx="7688400" cy="535200"/>
+          </a:xfrm>
+          <a:prstGeom prst="rect">
+            <a:avLst/>
+          </a:prstGeom>
+          <a:noFill/>
+          <a:ln>
+            <a:noFill/>
+          </a:ln>
+        </p:spPr>
+        <p:txBody>
+          <a:bodyPr spcFirstLastPara="1" wrap="square" lIns="91425" tIns="91425" rIns="91425" bIns="91425" anchor="t" anchorCtr="0">
+            <a:normAutofit fontScale="97500" lnSpcReduction="10000"/>
+          </a:bodyPr>
+          <a:lstStyle>
+            <a:defPPr marR="0" lvl="0" algn="l" rtl="0">
+              <a:lnSpc>
+                <a:spcPct val="100000"/>
+              </a:lnSpc>
+              <a:spcBef>
+                <a:spcPts val="0"/>
+              </a:spcBef>
+              <a:spcAft>
+                <a:spcPts val="0"/>
+              </a:spcAft>
+            </a:defPPr>
+            <a:lvl1pPr marR="0" lvl="0" algn="l" rtl="0">
+              <a:lnSpc>
+                <a:spcPct val="100000"/>
+              </a:lnSpc>
+              <a:spcBef>
+                <a:spcPts val="0"/>
+              </a:spcBef>
+              <a:spcAft>
+                <a:spcPts val="0"/>
+              </a:spcAft>
+              <a:buClr>
+                <a:schemeClr val="dk2"/>
+              </a:buClr>
+              <a:buSzPts val="2600"/>
+              <a:buFont typeface="Raleway"/>
+              <a:buNone/>
+              <a:defRPr sz="2600" b="1" i="0" u="none" strike="noStrike" cap="none">
+                <a:solidFill>
+                  <a:schemeClr val="dk2"/>
+                </a:solidFill>
+                <a:latin typeface="Raleway"/>
+                <a:ea typeface="Raleway"/>
+                <a:cs typeface="Raleway"/>
+                <a:sym typeface="Raleway"/>
+              </a:defRPr>
+            </a:lvl1pPr>
+            <a:lvl2pPr marR="0" lvl="1" algn="l" rtl="0">
+              <a:lnSpc>
+                <a:spcPct val="100000"/>
+              </a:lnSpc>
+              <a:spcBef>
+                <a:spcPts val="0"/>
+              </a:spcBef>
+              <a:spcAft>
+                <a:spcPts val="0"/>
+              </a:spcAft>
+              <a:buClr>
+                <a:schemeClr val="dk2"/>
+              </a:buClr>
+              <a:buSzPts val="2600"/>
+              <a:buFont typeface="Raleway"/>
+              <a:buNone/>
+              <a:defRPr sz="2600" b="1" i="0" u="none" strike="noStrike" cap="none">
+                <a:solidFill>
+                  <a:schemeClr val="dk2"/>
+                </a:solidFill>
+                <a:latin typeface="Raleway"/>
+                <a:ea typeface="Raleway"/>
+                <a:cs typeface="Raleway"/>
+                <a:sym typeface="Raleway"/>
+              </a:defRPr>
+            </a:lvl2pPr>
+            <a:lvl3pPr marR="0" lvl="2" algn="l" rtl="0">
+              <a:lnSpc>
+                <a:spcPct val="100000"/>
+              </a:lnSpc>
+              <a:spcBef>
+                <a:spcPts val="0"/>
+              </a:spcBef>
+              <a:spcAft>
+                <a:spcPts val="0"/>
+              </a:spcAft>
+              <a:buClr>
+                <a:schemeClr val="dk2"/>
+              </a:buClr>
+              <a:buSzPts val="2600"/>
+              <a:buFont typeface="Raleway"/>
+              <a:buNone/>
+              <a:defRPr sz="2600" b="1" i="0" u="none" strike="noStrike" cap="none">
+                <a:solidFill>
+                  <a:schemeClr val="dk2"/>
+                </a:solidFill>
+                <a:latin typeface="Raleway"/>
+                <a:ea typeface="Raleway"/>
+                <a:cs typeface="Raleway"/>
+                <a:sym typeface="Raleway"/>
+              </a:defRPr>
+            </a:lvl3pPr>
+            <a:lvl4pPr marR="0" lvl="3" algn="l" rtl="0">
+              <a:lnSpc>
+                <a:spcPct val="100000"/>
+              </a:lnSpc>
+              <a:spcBef>
+                <a:spcPts val="0"/>
+              </a:spcBef>
+              <a:spcAft>
+                <a:spcPts val="0"/>
+              </a:spcAft>
+              <a:buClr>
+                <a:schemeClr val="dk2"/>
+              </a:buClr>
+              <a:buSzPts val="2600"/>
+              <a:buFont typeface="Raleway"/>
+              <a:buNone/>
+              <a:defRPr sz="2600" b="1" i="0" u="none" strike="noStrike" cap="none">
+                <a:solidFill>
+                  <a:schemeClr val="dk2"/>
+                </a:solidFill>
+                <a:latin typeface="Raleway"/>
+                <a:ea typeface="Raleway"/>
+                <a:cs typeface="Raleway"/>
+                <a:sym typeface="Raleway"/>
+              </a:defRPr>
+            </a:lvl4pPr>
+            <a:lvl5pPr marR="0" lvl="4" algn="l" rtl="0">
+              <a:lnSpc>
+                <a:spcPct val="100000"/>
+              </a:lnSpc>
+              <a:spcBef>
+                <a:spcPts val="0"/>
+              </a:spcBef>
+              <a:spcAft>
+                <a:spcPts val="0"/>
+              </a:spcAft>
+              <a:buClr>
+                <a:schemeClr val="dk2"/>
+              </a:buClr>
+              <a:buSzPts val="2600"/>
+              <a:buFont typeface="Raleway"/>
+              <a:buNone/>
+              <a:defRPr sz="2600" b="1" i="0" u="none" strike="noStrike" cap="none">
+                <a:solidFill>
+                  <a:schemeClr val="dk2"/>
+                </a:solidFill>
+                <a:latin typeface="Raleway"/>
+                <a:ea typeface="Raleway"/>
+                <a:cs typeface="Raleway"/>
+                <a:sym typeface="Raleway"/>
+              </a:defRPr>
+            </a:lvl5pPr>
+            <a:lvl6pPr marR="0" lvl="5" algn="l" rtl="0">
+              <a:lnSpc>
+                <a:spcPct val="100000"/>
+              </a:lnSpc>
+              <a:spcBef>
+                <a:spcPts val="0"/>
+              </a:spcBef>
+              <a:spcAft>
+                <a:spcPts val="0"/>
+              </a:spcAft>
+              <a:buClr>
+                <a:schemeClr val="dk2"/>
+              </a:buClr>
+              <a:buSzPts val="2600"/>
+              <a:buFont typeface="Raleway"/>
+              <a:buNone/>
+              <a:defRPr sz="2600" b="1" i="0" u="none" strike="noStrike" cap="none">
+                <a:solidFill>
+                  <a:schemeClr val="dk2"/>
+                </a:solidFill>
+                <a:latin typeface="Raleway"/>
+                <a:ea typeface="Raleway"/>
+                <a:cs typeface="Raleway"/>
+                <a:sym typeface="Raleway"/>
+              </a:defRPr>
+            </a:lvl6pPr>
+            <a:lvl7pPr marR="0" lvl="6" algn="l" rtl="0">
+              <a:lnSpc>
+                <a:spcPct val="100000"/>
+              </a:lnSpc>
+              <a:spcBef>
+                <a:spcPts val="0"/>
+              </a:spcBef>
+              <a:spcAft>
+                <a:spcPts val="0"/>
+              </a:spcAft>
+              <a:buClr>
+                <a:schemeClr val="dk2"/>
+              </a:buClr>
+              <a:buSzPts val="2600"/>
+              <a:buFont typeface="Raleway"/>
+              <a:buNone/>
+              <a:defRPr sz="2600" b="1" i="0" u="none" strike="noStrike" cap="none">
+                <a:solidFill>
+                  <a:schemeClr val="dk2"/>
+                </a:solidFill>
+                <a:latin typeface="Raleway"/>
+                <a:ea typeface="Raleway"/>
+                <a:cs typeface="Raleway"/>
+                <a:sym typeface="Raleway"/>
+              </a:defRPr>
+            </a:lvl7pPr>
+            <a:lvl8pPr marR="0" lvl="7" algn="l" rtl="0">
+              <a:lnSpc>
+                <a:spcPct val="100000"/>
+              </a:lnSpc>
+              <a:spcBef>
+                <a:spcPts val="0"/>
+              </a:spcBef>
+              <a:spcAft>
+                <a:spcPts val="0"/>
+              </a:spcAft>
+              <a:buClr>
+                <a:schemeClr val="dk2"/>
+              </a:buClr>
+              <a:buSzPts val="2600"/>
+              <a:buFont typeface="Raleway"/>
+              <a:buNone/>
+              <a:defRPr sz="2600" b="1" i="0" u="none" strike="noStrike" cap="none">
+                <a:solidFill>
+                  <a:schemeClr val="dk2"/>
+                </a:solidFill>
+                <a:latin typeface="Raleway"/>
+                <a:ea typeface="Raleway"/>
+                <a:cs typeface="Raleway"/>
+                <a:sym typeface="Raleway"/>
+              </a:defRPr>
+            </a:lvl8pPr>
+            <a:lvl9pPr marR="0" lvl="8" algn="l" rtl="0">
+              <a:lnSpc>
+                <a:spcPct val="100000"/>
+              </a:lnSpc>
+              <a:spcBef>
+                <a:spcPts val="0"/>
+              </a:spcBef>
+              <a:spcAft>
+                <a:spcPts val="0"/>
+              </a:spcAft>
+              <a:buClr>
+                <a:schemeClr val="dk2"/>
+              </a:buClr>
+              <a:buSzPts val="2600"/>
+              <a:buFont typeface="Raleway"/>
+              <a:buNone/>
+              <a:defRPr sz="2600" b="1" i="0" u="none" strike="noStrike" cap="none">
+                <a:solidFill>
+                  <a:schemeClr val="dk2"/>
+                </a:solidFill>
+                <a:latin typeface="Raleway"/>
+                <a:ea typeface="Raleway"/>
+                <a:cs typeface="Raleway"/>
+                <a:sym typeface="Raleway"/>
+              </a:defRPr>
+            </a:lvl9pPr>
+          </a:lstStyle>
+          <a:p>
+            <a:r>
+              <a:rPr lang="hr-HR" dirty="0"/>
+              <a:t>Rezultati – korelacijska analiza</a:t>
+            </a:r>
+            <a:endParaRPr lang="en-US" dirty="0"/>
+          </a:p>
+        </p:txBody>
+      </p:sp>
+      <p:pic>
+        <p:nvPicPr>
+          <p:cNvPr id="5" name="Picture 4">
+            <a:extLst>
+              <a:ext uri="{FF2B5EF4-FFF2-40B4-BE49-F238E27FC236}">
+                <a16:creationId xmlns:a16="http://schemas.microsoft.com/office/drawing/2014/main" id="{EF83FA86-3570-80FB-71F8-BDBEA0BA77AF}"/>
               </a:ext>
             </a:extLst>
           </p:cNvPr>
@@ -8341,8 +8878,8 @@
         </p:blipFill>
         <p:spPr>
           <a:xfrm>
-            <a:off x="1614215" y="1360894"/>
-            <a:ext cx="5772363" cy="3697061"/>
+            <a:off x="2113864" y="3032001"/>
+            <a:ext cx="4779522" cy="1340597"/>
           </a:xfrm>
           <a:prstGeom prst="rect">
             <a:avLst/>
@@ -8352,7 +8889,7 @@
     </p:spTree>
     <p:extLst>
       <p:ext uri="{BB962C8B-B14F-4D97-AF65-F5344CB8AC3E}">
-        <p14:creationId xmlns:p14="http://schemas.microsoft.com/office/powerpoint/2010/main" val="3517878493"/>
+        <p14:creationId xmlns:p14="http://schemas.microsoft.com/office/powerpoint/2010/main" val="1895474421"/>
       </p:ext>
     </p:extLst>
   </p:cSld>
@@ -8362,7 +8899,7 @@
 </p:sld>
 </file>
 
-<file path=ppt/slides/slide14.xml><?xml version="1.0" encoding="utf-8"?>
+<file path=ppt/slides/slide15.xml><?xml version="1.0" encoding="utf-8"?>
 <p:sld xmlns:a="http://schemas.openxmlformats.org/drawingml/2006/main" xmlns:r="http://schemas.openxmlformats.org/officeDocument/2006/relationships" xmlns:p="http://schemas.openxmlformats.org/presentationml/2006/main">
   <p:cSld>
     <p:spTree>
@@ -8553,31 +9090,15 @@
         </p:spPr>
         <p:txBody>
           <a:bodyPr spcFirstLastPara="1" wrap="square" lIns="91425" tIns="91425" rIns="91425" bIns="91425" anchor="t" anchorCtr="0">
-            <a:normAutofit fontScale="92500" lnSpcReduction="20000"/>
+            <a:normAutofit fontScale="85000" lnSpcReduction="20000"/>
           </a:bodyPr>
           <a:lstStyle/>
           <a:p>
-            <a:pPr marL="0" lvl="0" indent="0" algn="l" rtl="0">
-              <a:spcBef>
-                <a:spcPts val="0"/>
-              </a:spcBef>
-              <a:spcAft>
-                <a:spcPts val="0"/>
-              </a:spcAft>
-              <a:buNone/>
-            </a:pPr>
-            <a:endParaRPr dirty="0"/>
-          </a:p>
-          <a:p>
-            <a:pPr marL="457200" lvl="0" indent="-317500" algn="l" rtl="0">
+            <a:pPr marL="482600" indent="-342900">
               <a:spcBef>
                 <a:spcPts val="1200"/>
               </a:spcBef>
-              <a:spcAft>
-                <a:spcPts val="0"/>
-              </a:spcAft>
               <a:buSzPts val="1400"/>
-              <a:buChar char="●"/>
             </a:pPr>
             <a:r>
               <a:rPr lang="hr-HR" sz="1400" dirty="0">
@@ -9040,7 +9561,7 @@
             </a:r>
           </a:p>
           <a:p>
-            <a:pPr marL="139700" lvl="0" indent="0" algn="l" rtl="0">
+            <a:pPr marL="457200" lvl="0" indent="-317500" algn="l" rtl="0">
               <a:spcBef>
                 <a:spcPts val="0"/>
               </a:spcBef>
@@ -9048,8 +9569,196 @@
                 <a:spcPts val="0"/>
               </a:spcAft>
               <a:buSzPts val="1400"/>
-              <a:buNone/>
+              <a:buChar char="●"/>
             </a:pPr>
+            <a:endParaRPr lang="hr-HR" sz="1400" dirty="0">
+              <a:solidFill>
+                <a:srgbClr val="010202"/>
+              </a:solidFill>
+              <a:latin typeface="Times New Roman" panose="02020603050405020304" pitchFamily="18" charset="0"/>
+              <a:ea typeface="Lato" panose="020F0502020204030203" pitchFamily="34" charset="0"/>
+              <a:cs typeface="Times New Roman" panose="02020603050405020304" pitchFamily="18" charset="0"/>
+            </a:endParaRPr>
+          </a:p>
+          <a:p>
+            <a:pPr marL="457200" lvl="0" indent="-317500" algn="l" rtl="0">
+              <a:spcBef>
+                <a:spcPts val="0"/>
+              </a:spcBef>
+              <a:spcAft>
+                <a:spcPts val="0"/>
+              </a:spcAft>
+              <a:buSzPts val="1400"/>
+              <a:buChar char="●"/>
+            </a:pPr>
+            <a:r>
+              <a:rPr lang="hr-HR" sz="1400">
+                <a:solidFill>
+                  <a:srgbClr val="010202"/>
+                </a:solidFill>
+                <a:latin typeface="Times New Roman" panose="02020603050405020304" pitchFamily="18" charset="0"/>
+                <a:ea typeface="Lato" panose="020F0502020204030203" pitchFamily="34" charset="0"/>
+                <a:cs typeface="Times New Roman" panose="02020603050405020304" pitchFamily="18" charset="0"/>
+              </a:rPr>
+              <a:t>Vizualno </a:t>
+            </a:r>
+            <a:r>
+              <a:rPr lang="hr-HR" sz="1400" dirty="0">
+                <a:solidFill>
+                  <a:srgbClr val="010202"/>
+                </a:solidFill>
+                <a:latin typeface="Times New Roman" panose="02020603050405020304" pitchFamily="18" charset="0"/>
+                <a:ea typeface="Lato" panose="020F0502020204030203" pitchFamily="34" charset="0"/>
+                <a:cs typeface="Times New Roman" panose="02020603050405020304" pitchFamily="18" charset="0"/>
+              </a:rPr>
+              <a:t>o</a:t>
+            </a:r>
+            <a:r>
+              <a:rPr lang="hr-HR" sz="1400">
+                <a:solidFill>
+                  <a:srgbClr val="010202"/>
+                </a:solidFill>
+                <a:latin typeface="Times New Roman" panose="02020603050405020304" pitchFamily="18" charset="0"/>
+                <a:ea typeface="Lato" panose="020F0502020204030203" pitchFamily="34" charset="0"/>
+                <a:cs typeface="Times New Roman" panose="02020603050405020304" pitchFamily="18" charset="0"/>
+              </a:rPr>
+              <a:t>dvajanje </a:t>
+            </a:r>
+            <a:r>
+              <a:rPr lang="en-US" sz="1400" dirty="0" err="1">
+                <a:solidFill>
+                  <a:srgbClr val="010202"/>
+                </a:solidFill>
+                <a:latin typeface="Times New Roman" panose="02020603050405020304" pitchFamily="18" charset="0"/>
+                <a:ea typeface="Lato" panose="020F0502020204030203" pitchFamily="34" charset="0"/>
+                <a:cs typeface="Times New Roman" panose="02020603050405020304" pitchFamily="18" charset="0"/>
+              </a:rPr>
+              <a:t>različi</a:t>
+            </a:r>
+            <a:r>
+              <a:rPr lang="hr-HR" sz="1400" dirty="0">
+                <a:solidFill>
+                  <a:srgbClr val="010202"/>
+                </a:solidFill>
+                <a:latin typeface="Times New Roman" panose="02020603050405020304" pitchFamily="18" charset="0"/>
+                <a:ea typeface="Lato" panose="020F0502020204030203" pitchFamily="34" charset="0"/>
+                <a:cs typeface="Times New Roman" panose="02020603050405020304" pitchFamily="18" charset="0"/>
+              </a:rPr>
+              <a:t>tih</a:t>
+            </a:r>
+            <a:r>
+              <a:rPr lang="en-US" sz="1400" dirty="0">
+                <a:solidFill>
+                  <a:srgbClr val="010202"/>
+                </a:solidFill>
+                <a:latin typeface="Times New Roman" panose="02020603050405020304" pitchFamily="18" charset="0"/>
+                <a:ea typeface="Lato" panose="020F0502020204030203" pitchFamily="34" charset="0"/>
+                <a:cs typeface="Times New Roman" panose="02020603050405020304" pitchFamily="18" charset="0"/>
+              </a:rPr>
+              <a:t> </a:t>
+            </a:r>
+            <a:r>
+              <a:rPr lang="en-US" sz="1400" dirty="0" err="1">
+                <a:solidFill>
+                  <a:srgbClr val="010202"/>
+                </a:solidFill>
+                <a:latin typeface="Times New Roman" panose="02020603050405020304" pitchFamily="18" charset="0"/>
+                <a:ea typeface="Lato" panose="020F0502020204030203" pitchFamily="34" charset="0"/>
+                <a:cs typeface="Times New Roman" panose="02020603050405020304" pitchFamily="18" charset="0"/>
+              </a:rPr>
+              <a:t>skupin</a:t>
+            </a:r>
+            <a:r>
+              <a:rPr lang="hr-HR" sz="1400" dirty="0">
+                <a:solidFill>
+                  <a:srgbClr val="010202"/>
+                </a:solidFill>
+                <a:latin typeface="Times New Roman" panose="02020603050405020304" pitchFamily="18" charset="0"/>
+                <a:ea typeface="Lato" panose="020F0502020204030203" pitchFamily="34" charset="0"/>
+                <a:cs typeface="Times New Roman" panose="02020603050405020304" pitchFamily="18" charset="0"/>
+              </a:rPr>
+              <a:t>a</a:t>
+            </a:r>
+            <a:r>
+              <a:rPr lang="en-US" sz="1400" dirty="0">
+                <a:solidFill>
+                  <a:srgbClr val="010202"/>
+                </a:solidFill>
+                <a:latin typeface="Times New Roman" panose="02020603050405020304" pitchFamily="18" charset="0"/>
+                <a:ea typeface="Lato" panose="020F0502020204030203" pitchFamily="34" charset="0"/>
+                <a:cs typeface="Times New Roman" panose="02020603050405020304" pitchFamily="18" charset="0"/>
+              </a:rPr>
+              <a:t> </a:t>
+            </a:r>
+            <a:r>
+              <a:rPr lang="en-US" sz="1400" dirty="0" err="1">
+                <a:solidFill>
+                  <a:srgbClr val="010202"/>
+                </a:solidFill>
+                <a:latin typeface="Times New Roman" panose="02020603050405020304" pitchFamily="18" charset="0"/>
+                <a:ea typeface="Lato" panose="020F0502020204030203" pitchFamily="34" charset="0"/>
+                <a:cs typeface="Times New Roman" panose="02020603050405020304" pitchFamily="18" charset="0"/>
+              </a:rPr>
+              <a:t>peptida</a:t>
+            </a:r>
+            <a:r>
+              <a:rPr lang="en-US" sz="1400" dirty="0">
+                <a:solidFill>
+                  <a:srgbClr val="010202"/>
+                </a:solidFill>
+                <a:latin typeface="Times New Roman" panose="02020603050405020304" pitchFamily="18" charset="0"/>
+                <a:ea typeface="Lato" panose="020F0502020204030203" pitchFamily="34" charset="0"/>
+                <a:cs typeface="Times New Roman" panose="02020603050405020304" pitchFamily="18" charset="0"/>
+              </a:rPr>
+              <a:t> u </a:t>
+            </a:r>
+            <a:r>
+              <a:rPr lang="en-US" sz="1400" dirty="0" err="1">
+                <a:solidFill>
+                  <a:srgbClr val="010202"/>
+                </a:solidFill>
+                <a:latin typeface="Times New Roman" panose="02020603050405020304" pitchFamily="18" charset="0"/>
+                <a:ea typeface="Lato" panose="020F0502020204030203" pitchFamily="34" charset="0"/>
+                <a:cs typeface="Times New Roman" panose="02020603050405020304" pitchFamily="18" charset="0"/>
+              </a:rPr>
+              <a:t>latentnom</a:t>
+            </a:r>
+            <a:r>
+              <a:rPr lang="en-US" sz="1400" dirty="0">
+                <a:solidFill>
+                  <a:srgbClr val="010202"/>
+                </a:solidFill>
+                <a:latin typeface="Times New Roman" panose="02020603050405020304" pitchFamily="18" charset="0"/>
+                <a:ea typeface="Lato" panose="020F0502020204030203" pitchFamily="34" charset="0"/>
+                <a:cs typeface="Times New Roman" panose="02020603050405020304" pitchFamily="18" charset="0"/>
+              </a:rPr>
+              <a:t> </a:t>
+            </a:r>
+            <a:r>
+              <a:rPr lang="en-US" sz="1400" dirty="0" err="1">
+                <a:solidFill>
+                  <a:srgbClr val="010202"/>
+                </a:solidFill>
+                <a:latin typeface="Times New Roman" panose="02020603050405020304" pitchFamily="18" charset="0"/>
+                <a:ea typeface="Lato" panose="020F0502020204030203" pitchFamily="34" charset="0"/>
+                <a:cs typeface="Times New Roman" panose="02020603050405020304" pitchFamily="18" charset="0"/>
+              </a:rPr>
+              <a:t>prostoru</a:t>
+            </a:r>
+            <a:r>
+              <a:rPr lang="en-US" sz="1400" dirty="0">
+                <a:solidFill>
+                  <a:srgbClr val="010202"/>
+                </a:solidFill>
+                <a:latin typeface="Times New Roman" panose="02020603050405020304" pitchFamily="18" charset="0"/>
+                <a:ea typeface="Lato" panose="020F0502020204030203" pitchFamily="34" charset="0"/>
+                <a:cs typeface="Times New Roman" panose="02020603050405020304" pitchFamily="18" charset="0"/>
+              </a:rPr>
+              <a:t> </a:t>
+            </a:r>
+            <a:br>
+              <a:rPr lang="en-US" sz="2000" dirty="0"/>
+            </a:br>
             <a:endParaRPr lang="hr-HR" sz="1400" dirty="0">
               <a:solidFill>
                 <a:srgbClr val="010202"/>
@@ -9875,8 +10584,17 @@
                 <a:latin typeface="Times New Roman" panose="02020603050405020304" pitchFamily="18" charset="0"/>
                 <a:cs typeface="Times New Roman" panose="02020603050405020304" pitchFamily="18" charset="0"/>
               </a:rPr>
-              <a:t>Imaju gubitke</a:t>
-            </a:r>
+              <a:t>Uče automatski iz primjera podataka</a:t>
+            </a:r>
+            <a:endParaRPr lang="hr-HR" sz="1600" dirty="0">
+              <a:solidFill>
+                <a:srgbClr val="000000"/>
+              </a:solidFill>
+              <a:effectLst/>
+              <a:latin typeface="Times New Roman" panose="02020603050405020304" pitchFamily="18" charset="0"/>
+              <a:ea typeface="Calibri" panose="020F0502020204030204" pitchFamily="34" charset="0"/>
+              <a:cs typeface="Times New Roman" panose="02020603050405020304" pitchFamily="18" charset="0"/>
+            </a:endParaRPr>
           </a:p>
           <a:p>
             <a:pPr lvl="1" indent="-317500">
@@ -9892,7 +10610,7 @@
                 <a:latin typeface="Times New Roman" panose="02020603050405020304" pitchFamily="18" charset="0"/>
                 <a:cs typeface="Times New Roman" panose="02020603050405020304" pitchFamily="18" charset="0"/>
               </a:rPr>
-              <a:t>Uče automatski iz primjera podataka</a:t>
+              <a:t>Imaju gubitke</a:t>
             </a:r>
           </a:p>
         </p:txBody>
@@ -10014,6 +10732,16 @@
         <p:txBody>
           <a:bodyPr/>
           <a:lstStyle/>
+          <a:p>
+            <a:endParaRPr lang="hr-HR" sz="1800" dirty="0">
+              <a:solidFill>
+                <a:srgbClr val="000000"/>
+              </a:solidFill>
+              <a:effectLst/>
+              <a:latin typeface="Times New Roman" panose="02020603050405020304" pitchFamily="18" charset="0"/>
+              <a:ea typeface="Calibri" panose="020F0502020204030204" pitchFamily="34" charset="0"/>
+            </a:endParaRPr>
+          </a:p>
           <a:p>
             <a:endParaRPr lang="hr-HR" sz="1800" dirty="0">
               <a:solidFill>
@@ -10201,7 +10929,7 @@
         <p:spPr/>
         <p:txBody>
           <a:bodyPr>
-            <a:normAutofit/>
+            <a:normAutofit lnSpcReduction="10000"/>
           </a:bodyPr>
           <a:lstStyle/>
           <a:p>
@@ -10237,7 +10965,31 @@
                 <a:ea typeface="Calibri" panose="020F0502020204030204" pitchFamily="34" charset="0"/>
                 <a:cs typeface="Times New Roman" panose="02020603050405020304" pitchFamily="18" charset="0"/>
               </a:rPr>
-              <a:t>10459 sekvenci peptida s oznakom aktivnosti</a:t>
+              <a:t>10459 sekvenci peptida s oznakom aktivnosti i </a:t>
+            </a:r>
+            <a:r>
+              <a:rPr lang="hr-HR" sz="1600">
+                <a:solidFill>
+                  <a:schemeClr val="bg2"/>
+                </a:solidFill>
+                <a:effectLst/>
+                <a:latin typeface="Times New Roman" panose="02020603050405020304" pitchFamily="18" charset="0"/>
+                <a:ea typeface="Calibri" panose="020F0502020204030204" pitchFamily="34" charset="0"/>
+                <a:cs typeface="Times New Roman" panose="02020603050405020304" pitchFamily="18" charset="0"/>
+              </a:rPr>
+              <a:t>izračunatim fizikalno-kemijskim </a:t>
+            </a:r>
+            <a:r>
+              <a:rPr lang="hr-HR" sz="1600" dirty="0">
+                <a:solidFill>
+                  <a:schemeClr val="bg2"/>
+                </a:solidFill>
+                <a:effectLst/>
+                <a:latin typeface="Times New Roman" panose="02020603050405020304" pitchFamily="18" charset="0"/>
+                <a:ea typeface="Calibri" panose="020F0502020204030204" pitchFamily="34" charset="0"/>
+                <a:cs typeface="Times New Roman" panose="02020603050405020304" pitchFamily="18" charset="0"/>
+              </a:rPr>
+              <a:t>značajkama</a:t>
             </a:r>
           </a:p>
           <a:p>
@@ -10348,7 +11100,12 @@
             <p:ph type="title"/>
           </p:nvPr>
         </p:nvSpPr>
-        <p:spPr/>
+        <p:spPr>
+          <a:xfrm>
+            <a:off x="725850" y="535925"/>
+            <a:ext cx="7688700" cy="535200"/>
+          </a:xfrm>
+        </p:spPr>
         <p:txBody>
           <a:bodyPr>
             <a:normAutofit fontScale="90000"/>
@@ -10357,7 +11114,7 @@
           <a:p>
             <a:r>
               <a:rPr lang="hr-HR" dirty="0"/>
-              <a:t>Rezultati</a:t>
+              <a:t>Rezultati - trening</a:t>
             </a:r>
             <a:endParaRPr lang="en-US" dirty="0"/>
           </a:p>
@@ -10390,10 +11147,10 @@
       </p:sp>
       <p:pic>
         <p:nvPicPr>
-          <p:cNvPr id="5" name="Picture 4">
+          <p:cNvPr id="4" name="Picture 3" descr="A graph of different colored lines&#10;&#10;Description automatically generated">
             <a:extLst>
               <a:ext uri="{FF2B5EF4-FFF2-40B4-BE49-F238E27FC236}">
-                <a16:creationId xmlns:a16="http://schemas.microsoft.com/office/drawing/2014/main" id="{80041889-FFA2-8C1D-000B-92043DD44220}"/>
+                <a16:creationId xmlns:a16="http://schemas.microsoft.com/office/drawing/2014/main" id="{65D70E52-B972-DDD8-FD42-1E989999DC74}"/>
               </a:ext>
             </a:extLst>
           </p:cNvPr>
@@ -10403,15 +11160,56 @@
           <p:nvPr/>
         </p:nvPicPr>
         <p:blipFill>
-          <a:blip r:embed="rId2"/>
+          <a:blip r:embed="rId2">
+            <a:extLst>
+              <a:ext uri="{28A0092B-C50C-407E-A947-70E740481C1C}">
+                <a14:useLocalDpi xmlns:a14="http://schemas.microsoft.com/office/drawing/2010/main" val="0"/>
+              </a:ext>
+            </a:extLst>
+          </a:blip>
+          <a:srcRect/>
+          <a:stretch>
+            <a:fillRect/>
+          </a:stretch>
+        </p:blipFill>
+        <p:spPr bwMode="auto">
+          <a:xfrm>
+            <a:off x="2478987" y="2571750"/>
+            <a:ext cx="4320956" cy="2412726"/>
+          </a:xfrm>
+          <a:prstGeom prst="rect">
+            <a:avLst/>
+          </a:prstGeom>
+          <a:noFill/>
+          <a:ln>
+            <a:noFill/>
+          </a:ln>
+        </p:spPr>
+      </p:pic>
+      <p:pic>
+        <p:nvPicPr>
+          <p:cNvPr id="8" name="Picture 7">
+            <a:extLst>
+              <a:ext uri="{FF2B5EF4-FFF2-40B4-BE49-F238E27FC236}">
+                <a16:creationId xmlns:a16="http://schemas.microsoft.com/office/drawing/2014/main" id="{43DDCE32-08FB-E918-6E27-2981EFF68C97}"/>
+              </a:ext>
+            </a:extLst>
+          </p:cNvPr>
+          <p:cNvPicPr>
+            <a:picLocks noChangeAspect="1"/>
+          </p:cNvPicPr>
+          <p:nvPr/>
+        </p:nvPicPr>
+        <p:blipFill>
+          <a:blip r:embed="rId3"/>
           <a:stretch>
             <a:fillRect/>
           </a:stretch>
         </p:blipFill>
         <p:spPr>
           <a:xfrm>
-            <a:off x="727649" y="1828154"/>
-            <a:ext cx="7688701" cy="1786172"/>
+            <a:off x="2205731" y="1215854"/>
+            <a:ext cx="4728936" cy="1355896"/>
           </a:xfrm>
           <a:prstGeom prst="rect">
             <a:avLst/>
@@ -10464,7 +11262,12 @@
             <p:ph type="title"/>
           </p:nvPr>
         </p:nvSpPr>
-        <p:spPr/>
+        <p:spPr>
+          <a:xfrm>
+            <a:off x="729450" y="535925"/>
+            <a:ext cx="7688700" cy="535200"/>
+          </a:xfrm>
+        </p:spPr>
         <p:txBody>
           <a:bodyPr>
             <a:normAutofit fontScale="90000"/>
@@ -10473,7 +11276,7 @@
           <a:p>
             <a:r>
               <a:rPr lang="hr-HR" dirty="0"/>
-              <a:t>Rezultati</a:t>
+              <a:t>Rezultati - trening</a:t>
             </a:r>
             <a:endParaRPr lang="en-US" dirty="0"/>
           </a:p>
@@ -10506,10 +11309,10 @@
       </p:sp>
       <p:pic>
         <p:nvPicPr>
-          <p:cNvPr id="5" name="Picture 4">
+          <p:cNvPr id="6" name="Picture 5">
             <a:extLst>
               <a:ext uri="{FF2B5EF4-FFF2-40B4-BE49-F238E27FC236}">
-                <a16:creationId xmlns:a16="http://schemas.microsoft.com/office/drawing/2014/main" id="{80188AB0-28BC-A6E5-7BDF-4B1EC3FB856A}"/>
+                <a16:creationId xmlns:a16="http://schemas.microsoft.com/office/drawing/2014/main" id="{95B19457-46C6-7F8A-E361-6F1FA4CD24A3}"/>
               </a:ext>
             </a:extLst>
           </p:cNvPr>
@@ -10526,8 +11329,8 @@
         </p:blipFill>
         <p:spPr>
           <a:xfrm>
-            <a:off x="561975" y="1880687"/>
-            <a:ext cx="8020050" cy="2657475"/>
+            <a:off x="533400" y="1606300"/>
+            <a:ext cx="8077200" cy="2733675"/>
           </a:xfrm>
           <a:prstGeom prst="rect">
             <a:avLst/>
@@ -10589,7 +11392,7 @@
           <a:p>
             <a:r>
               <a:rPr lang="hr-HR" dirty="0"/>
-              <a:t>Rezultati</a:t>
+              <a:t>Rezultati - trening</a:t>
             </a:r>
             <a:endParaRPr lang="en-US" dirty="0"/>
           </a:p>
@@ -10651,7 +11454,30 @@
                 <a:ea typeface="Calibri" panose="020F0502020204030204" pitchFamily="34" charset="0"/>
                 <a:cs typeface="Times New Roman" panose="02020603050405020304" pitchFamily="18" charset="0"/>
               </a:rPr>
-              <a:t>normalizirana srednja udaljenost rekonstrukcije u latentnom prostoru) – 0.103</a:t>
+              <a:t>normalizirana srednja udaljenost rekonstrukcije u latentnom prostoru) – </a:t>
+            </a:r>
+            <a:r>
+              <a:rPr lang="hr-HR" sz="1400" dirty="0">
+                <a:solidFill>
+                  <a:schemeClr val="bg2"/>
+                </a:solidFill>
+                <a:latin typeface="Times New Roman" panose="02020603050405020304" pitchFamily="18" charset="0"/>
+                <a:ea typeface="Calibri" panose="020F0502020204030204" pitchFamily="34" charset="0"/>
+                <a:cs typeface="Times New Roman" panose="02020603050405020304" pitchFamily="18" charset="0"/>
+              </a:rPr>
+              <a:t>10,</a:t>
+            </a:r>
+            <a:r>
+              <a:rPr lang="hr-HR" sz="1400" dirty="0">
+                <a:solidFill>
+                  <a:schemeClr val="bg2"/>
+                </a:solidFill>
+                <a:effectLst/>
+                <a:latin typeface="Times New Roman" panose="02020603050405020304" pitchFamily="18" charset="0"/>
+                <a:ea typeface="Calibri" panose="020F0502020204030204" pitchFamily="34" charset="0"/>
+                <a:cs typeface="Times New Roman" panose="02020603050405020304" pitchFamily="18" charset="0"/>
+              </a:rPr>
+              <a:t>3%</a:t>
             </a:r>
           </a:p>
           <a:p>
@@ -10664,7 +11490,7 @@
                 <a:latin typeface="Times New Roman" panose="02020603050405020304" pitchFamily="18" charset="0"/>
                 <a:cs typeface="Times New Roman" panose="02020603050405020304" pitchFamily="18" charset="0"/>
               </a:rPr>
-              <a:t>PKK (Pearsonov koeficijent korelacije) – 0.7917</a:t>
+              <a:t>PKK (Pearsonov koeficijent korelacije) – 79,17%</a:t>
             </a:r>
           </a:p>
           <a:p>
@@ -10709,7 +11535,7 @@
                 <a:latin typeface="Times New Roman" panose="02020603050405020304" pitchFamily="18" charset="0"/>
                 <a:cs typeface="Times New Roman" panose="02020603050405020304" pitchFamily="18" charset="0"/>
               </a:rPr>
-              <a:t> - 0.0869</a:t>
+              <a:t> – 8,69%</a:t>
             </a:r>
           </a:p>
         </p:txBody>

</xml_diff>